<commit_message>
need to fix reflected
</commit_message>
<xml_diff>
--- a/docs/postermore.pptx
+++ b/docs/postermore.pptx
@@ -4804,6 +4804,78 @@
           <a:chExt cx="0" cy="0"/>
         </a:xfrm>
       </p:grpSpPr>
+      <p:pic>
+        <p:nvPicPr>
+          <p:cNvPr id="65" name="Picture 64">
+            <a:extLst>
+              <a:ext uri="{FF2B5EF4-FFF2-40B4-BE49-F238E27FC236}">
+                <a16:creationId xmlns:a16="http://schemas.microsoft.com/office/drawing/2014/main" id="{0C94D495-1904-514C-886B-86EE2E55570A}"/>
+              </a:ext>
+            </a:extLst>
+          </p:cNvPr>
+          <p:cNvPicPr>
+            <a:picLocks noChangeAspect="1"/>
+          </p:cNvPicPr>
+          <p:nvPr/>
+        </p:nvPicPr>
+        <p:blipFill>
+          <a:blip r:embed="rId2">
+            <a:extLst>
+              <a:ext uri="{28A0092B-C50C-407E-A947-70E740481C1C}">
+                <a14:useLocalDpi xmlns:a14="http://schemas.microsoft.com/office/drawing/2010/main" val="0"/>
+              </a:ext>
+            </a:extLst>
+          </a:blip>
+          <a:stretch>
+            <a:fillRect/>
+          </a:stretch>
+        </p:blipFill>
+        <p:spPr>
+          <a:xfrm>
+            <a:off x="0" y="159964"/>
+            <a:ext cx="9229060" cy="3626161"/>
+          </a:xfrm>
+          <a:prstGeom prst="rect">
+            <a:avLst/>
+          </a:prstGeom>
+        </p:spPr>
+      </p:pic>
+      <p:pic>
+        <p:nvPicPr>
+          <p:cNvPr id="56" name="Picture 55">
+            <a:extLst>
+              <a:ext uri="{FF2B5EF4-FFF2-40B4-BE49-F238E27FC236}">
+                <a16:creationId xmlns:a16="http://schemas.microsoft.com/office/drawing/2014/main" id="{228ADAD2-6032-8C4F-8A4C-46926F1DBC20}"/>
+              </a:ext>
+            </a:extLst>
+          </p:cNvPr>
+          <p:cNvPicPr>
+            <a:picLocks noChangeAspect="1"/>
+          </p:cNvPicPr>
+          <p:nvPr/>
+        </p:nvPicPr>
+        <p:blipFill>
+          <a:blip r:embed="rId3">
+            <a:extLst>
+              <a:ext uri="{28A0092B-C50C-407E-A947-70E740481C1C}">
+                <a14:useLocalDpi xmlns:a14="http://schemas.microsoft.com/office/drawing/2010/main" val="0"/>
+              </a:ext>
+            </a:extLst>
+          </a:blip>
+          <a:stretch>
+            <a:fillRect/>
+          </a:stretch>
+        </p:blipFill>
+        <p:spPr>
+          <a:xfrm>
+            <a:off x="34543847" y="1"/>
+            <a:ext cx="9164473" cy="3786124"/>
+          </a:xfrm>
+          <a:prstGeom prst="rect">
+            <a:avLst/>
+          </a:prstGeom>
+        </p:spPr>
+      </p:pic>
       <p:sp>
         <p:nvSpPr>
           <p:cNvPr id="4" name="Title 3"/>
@@ -5083,7 +5155,7 @@
                 <a:latin typeface="Times New Roman" panose="02020603050405020304" pitchFamily="18" charset="0"/>
                 <a:cs typeface="Times New Roman" panose="02020603050405020304" pitchFamily="18" charset="0"/>
               </a:rPr>
-              <a:t>When generating the corridors, we fix some of the initial parameters in the corridors. Below are some of the corridor structures generated with various fixed parameters.</a:t>
+              <a:t>When generating the corridors, we fix 3 out of 4 of our initial conditions. With these conditions set, we call this a classical skewed top corridor. Below are some of the corridor structures generated with various fixed parameters.</a:t>
             </a:r>
             <a:endParaRPr lang="en-US" sz="3600" dirty="0">
               <a:latin typeface="Times New Roman" panose="02020603050405020304" pitchFamily="18" charset="0"/>
@@ -5745,7 +5817,7 @@
           <p:nvPr/>
         </p:nvPicPr>
         <p:blipFill>
-          <a:blip r:embed="rId2"/>
+          <a:blip r:embed="rId4"/>
           <a:stretch>
             <a:fillRect/>
           </a:stretch>
@@ -5775,7 +5847,7 @@
           <p:nvPr/>
         </p:nvPicPr>
         <p:blipFill>
-          <a:blip r:embed="rId3">
+          <a:blip r:embed="rId5">
             <a:extLst>
               <a:ext uri="{28A0092B-C50C-407E-A947-70E740481C1C}">
                 <a14:useLocalDpi xmlns:a14="http://schemas.microsoft.com/office/drawing/2010/main" val="0"/>
@@ -6069,7 +6141,7 @@
         <p:spPr>
           <a:xfrm>
             <a:off x="13158216" y="21029486"/>
-            <a:ext cx="6003274" cy="621531"/>
+            <a:ext cx="6141720" cy="621531"/>
           </a:xfrm>
         </p:spPr>
         <p:txBody>
@@ -6081,7 +6153,7 @@
                 <a:latin typeface="Times New Roman" panose="02020603050405020304" pitchFamily="18" charset="0"/>
                 <a:cs typeface="Times New Roman" panose="02020603050405020304" pitchFamily="18" charset="0"/>
               </a:rPr>
-              <a:t>Non-Classical Skewed-Top Corridor</a:t>
+              <a:t>Non-Classical Skewed-Top Corridors</a:t>
             </a:r>
           </a:p>
         </p:txBody>
@@ -6335,7 +6407,7 @@
                 <a:latin typeface="Times New Roman" panose="02020603050405020304" pitchFamily="18" charset="0"/>
                 <a:cs typeface="Times New Roman" panose="02020603050405020304" pitchFamily="18" charset="0"/>
               </a:rPr>
-              <a:t>Corridor Generating Function</a:t>
+              <a:t>Corridor Generating Formula</a:t>
             </a:r>
             <a:endParaRPr lang="en-US" sz="2800" b="1" dirty="0">
               <a:latin typeface="Times New Roman" panose="02020603050405020304" pitchFamily="18" charset="0"/>
@@ -6826,7 +6898,7 @@
           <p:nvPr/>
         </p:nvPicPr>
         <p:blipFill>
-          <a:blip r:embed="rId4">
+          <a:blip r:embed="rId6">
             <a:extLst>
               <a:ext uri="{28A0092B-C50C-407E-A947-70E740481C1C}">
                 <a14:useLocalDpi xmlns:a14="http://schemas.microsoft.com/office/drawing/2010/main" val="0"/>
@@ -6867,7 +6939,7 @@
           <p:nvPr/>
         </p:nvPicPr>
         <p:blipFill>
-          <a:blip r:embed="rId5">
+          <a:blip r:embed="rId7">
             <a:extLst>
               <a:ext uri="{28A0092B-C50C-407E-A947-70E740481C1C}">
                 <a14:useLocalDpi xmlns:a14="http://schemas.microsoft.com/office/drawing/2010/main" val="0"/>
@@ -6908,7 +6980,7 @@
           <p:nvPr/>
         </p:nvPicPr>
         <p:blipFill>
-          <a:blip r:embed="rId6">
+          <a:blip r:embed="rId8">
             <a:extLst>
               <a:ext uri="{28A0092B-C50C-407E-A947-70E740481C1C}">
                 <a14:useLocalDpi xmlns:a14="http://schemas.microsoft.com/office/drawing/2010/main" val="0"/>

</xml_diff>